<commit_message>
Update the solver option guide. Some default values of options have been updated in the codes and the document.
</commit_message>
<xml_diff>
--- a/asset/figure.pptx
+++ b/asset/figure.pptx
@@ -243,7 +243,7 @@
           <a:p>
             <a:fld id="{99E56E5A-B1CC-FC42-83E3-F1DDB0899516}" type="datetimeFigureOut">
               <a:rPr kumimoji="1" lang="ja-JP" altLang="en-US" smtClean="0"/>
-              <a:t>2020/5/2</a:t>
+              <a:t>2020/7/22</a:t>
             </a:fld>
             <a:endParaRPr kumimoji="1" lang="ja-JP" altLang="en-US"/>
           </a:p>
@@ -445,7 +445,7 @@
           <a:p>
             <a:fld id="{99E56E5A-B1CC-FC42-83E3-F1DDB0899516}" type="datetimeFigureOut">
               <a:rPr kumimoji="1" lang="ja-JP" altLang="en-US" smtClean="0"/>
-              <a:t>2020/5/2</a:t>
+              <a:t>2020/7/22</a:t>
             </a:fld>
             <a:endParaRPr kumimoji="1" lang="ja-JP" altLang="en-US"/>
           </a:p>
@@ -657,7 +657,7 @@
           <a:p>
             <a:fld id="{99E56E5A-B1CC-FC42-83E3-F1DDB0899516}" type="datetimeFigureOut">
               <a:rPr kumimoji="1" lang="ja-JP" altLang="en-US" smtClean="0"/>
-              <a:t>2020/5/2</a:t>
+              <a:t>2020/7/22</a:t>
             </a:fld>
             <a:endParaRPr kumimoji="1" lang="ja-JP" altLang="en-US"/>
           </a:p>
@@ -859,7 +859,7 @@
           <a:p>
             <a:fld id="{99E56E5A-B1CC-FC42-83E3-F1DDB0899516}" type="datetimeFigureOut">
               <a:rPr kumimoji="1" lang="ja-JP" altLang="en-US" smtClean="0"/>
-              <a:t>2020/5/2</a:t>
+              <a:t>2020/7/22</a:t>
             </a:fld>
             <a:endParaRPr kumimoji="1" lang="ja-JP" altLang="en-US"/>
           </a:p>
@@ -1103,7 +1103,7 @@
           <a:p>
             <a:fld id="{99E56E5A-B1CC-FC42-83E3-F1DDB0899516}" type="datetimeFigureOut">
               <a:rPr kumimoji="1" lang="ja-JP" altLang="en-US" smtClean="0"/>
-              <a:t>2020/5/2</a:t>
+              <a:t>2020/7/22</a:t>
             </a:fld>
             <a:endParaRPr kumimoji="1" lang="ja-JP" altLang="en-US"/>
           </a:p>
@@ -1399,7 +1399,7 @@
           <a:p>
             <a:fld id="{99E56E5A-B1CC-FC42-83E3-F1DDB0899516}" type="datetimeFigureOut">
               <a:rPr kumimoji="1" lang="ja-JP" altLang="en-US" smtClean="0"/>
-              <a:t>2020/5/2</a:t>
+              <a:t>2020/7/22</a:t>
             </a:fld>
             <a:endParaRPr kumimoji="1" lang="ja-JP" altLang="en-US"/>
           </a:p>
@@ -1830,7 +1830,7 @@
           <a:p>
             <a:fld id="{99E56E5A-B1CC-FC42-83E3-F1DDB0899516}" type="datetimeFigureOut">
               <a:rPr kumimoji="1" lang="ja-JP" altLang="en-US" smtClean="0"/>
-              <a:t>2020/5/2</a:t>
+              <a:t>2020/7/22</a:t>
             </a:fld>
             <a:endParaRPr kumimoji="1" lang="ja-JP" altLang="en-US"/>
           </a:p>
@@ -1948,7 +1948,7 @@
           <a:p>
             <a:fld id="{99E56E5A-B1CC-FC42-83E3-F1DDB0899516}" type="datetimeFigureOut">
               <a:rPr kumimoji="1" lang="ja-JP" altLang="en-US" smtClean="0"/>
-              <a:t>2020/5/2</a:t>
+              <a:t>2020/7/22</a:t>
             </a:fld>
             <a:endParaRPr kumimoji="1" lang="ja-JP" altLang="en-US"/>
           </a:p>
@@ -2043,7 +2043,7 @@
           <a:p>
             <a:fld id="{99E56E5A-B1CC-FC42-83E3-F1DDB0899516}" type="datetimeFigureOut">
               <a:rPr kumimoji="1" lang="ja-JP" altLang="en-US" smtClean="0"/>
-              <a:t>2020/5/2</a:t>
+              <a:t>2020/7/22</a:t>
             </a:fld>
             <a:endParaRPr kumimoji="1" lang="ja-JP" altLang="en-US"/>
           </a:p>
@@ -2352,7 +2352,7 @@
           <a:p>
             <a:fld id="{99E56E5A-B1CC-FC42-83E3-F1DDB0899516}" type="datetimeFigureOut">
               <a:rPr kumimoji="1" lang="ja-JP" altLang="en-US" smtClean="0"/>
-              <a:t>2020/5/2</a:t>
+              <a:t>2020/7/22</a:t>
             </a:fld>
             <a:endParaRPr kumimoji="1" lang="ja-JP" altLang="en-US"/>
           </a:p>
@@ -2609,7 +2609,7 @@
           <a:p>
             <a:fld id="{99E56E5A-B1CC-FC42-83E3-F1DDB0899516}" type="datetimeFigureOut">
               <a:rPr kumimoji="1" lang="ja-JP" altLang="en-US" smtClean="0"/>
-              <a:t>2020/5/2</a:t>
+              <a:t>2020/7/22</a:t>
             </a:fld>
             <a:endParaRPr kumimoji="1" lang="ja-JP" altLang="en-US"/>
           </a:p>
@@ -2854,7 +2854,7 @@
           <a:p>
             <a:fld id="{99E56E5A-B1CC-FC42-83E3-F1DDB0899516}" type="datetimeFigureOut">
               <a:rPr kumimoji="1" lang="ja-JP" altLang="en-US" smtClean="0"/>
-              <a:t>2020/5/2</a:t>
+              <a:t>2020/7/22</a:t>
             </a:fld>
             <a:endParaRPr kumimoji="1" lang="ja-JP" altLang="en-US"/>
           </a:p>
@@ -3273,7 +3273,7 @@
         </p:nvSpPr>
         <p:spPr>
           <a:xfrm>
-            <a:off x="1429407" y="3240625"/>
+            <a:off x="1429407" y="3986854"/>
             <a:ext cx="2932386" cy="2319342"/>
           </a:xfrm>
           <a:prstGeom prst="roundRect">
@@ -3407,7 +3407,7 @@
         </p:nvSpPr>
         <p:spPr>
           <a:xfrm>
-            <a:off x="2604423" y="6344951"/>
+            <a:off x="2604423" y="7091180"/>
             <a:ext cx="622739" cy="228600"/>
           </a:xfrm>
           <a:prstGeom prst="flowChartTerminator">
@@ -3484,7 +3484,7 @@
         </p:nvSpPr>
         <p:spPr>
           <a:xfrm>
-            <a:off x="1865584" y="3342281"/>
+            <a:off x="1865584" y="4088510"/>
             <a:ext cx="2120465" cy="465083"/>
           </a:xfrm>
           <a:prstGeom prst="flowChartDecision">
@@ -3559,7 +3559,7 @@
         </p:nvSpPr>
         <p:spPr>
           <a:xfrm>
-            <a:off x="1865585" y="2103377"/>
+            <a:off x="1865585" y="2849606"/>
             <a:ext cx="2120465" cy="510900"/>
           </a:xfrm>
           <a:prstGeom prst="flowChartPredefinedProcess">
@@ -3810,7 +3810,7 @@
         </p:nvSpPr>
         <p:spPr>
           <a:xfrm>
-            <a:off x="1865584" y="2815776"/>
+            <a:off x="1865584" y="3562005"/>
             <a:ext cx="2120466" cy="323194"/>
           </a:xfrm>
           <a:prstGeom prst="flowChartProcess">
@@ -3885,7 +3885,7 @@
         </p:nvSpPr>
         <p:spPr>
           <a:xfrm>
-            <a:off x="1865580" y="3985362"/>
+            <a:off x="1865580" y="4731591"/>
             <a:ext cx="2120466" cy="323194"/>
           </a:xfrm>
           <a:prstGeom prst="flowChartPredefinedProcess">
@@ -3983,7 +3983,7 @@
         </p:nvSpPr>
         <p:spPr>
           <a:xfrm>
-            <a:off x="1865582" y="5130461"/>
+            <a:off x="1865582" y="5876690"/>
             <a:ext cx="2120464" cy="323194"/>
           </a:xfrm>
           <a:prstGeom prst="flowChartProcess">
@@ -4058,7 +4058,7 @@
         </p:nvSpPr>
         <p:spPr>
           <a:xfrm>
-            <a:off x="1865582" y="4572303"/>
+            <a:off x="1865582" y="5318532"/>
             <a:ext cx="2120464" cy="323194"/>
           </a:xfrm>
           <a:prstGeom prst="flowChartProcess">
@@ -4221,15 +4221,15 @@
           </p:cNvPr>
           <p:cNvCxnSpPr>
             <a:cxnSpLocks/>
-            <a:stCxn id="9" idx="2"/>
+            <a:stCxn id="53" idx="2"/>
             <a:endCxn id="7" idx="0"/>
           </p:cNvCxnSpPr>
           <p:nvPr/>
         </p:nvCxnSpPr>
         <p:spPr>
           <a:xfrm>
-            <a:off x="2925817" y="1920717"/>
-            <a:ext cx="1" cy="182660"/>
+            <a:off x="2925812" y="2648126"/>
+            <a:ext cx="6" cy="201480"/>
           </a:xfrm>
           <a:prstGeom prst="straightConnector1">
             <a:avLst/>
@@ -4274,7 +4274,7 @@
         </p:nvCxnSpPr>
         <p:spPr>
           <a:xfrm flipH="1">
-            <a:off x="2925817" y="2614277"/>
+            <a:off x="2925817" y="3360506"/>
             <a:ext cx="1" cy="201499"/>
           </a:xfrm>
           <a:prstGeom prst="straightConnector1">
@@ -4320,7 +4320,7 @@
         </p:nvCxnSpPr>
         <p:spPr>
           <a:xfrm>
-            <a:off x="2925817" y="3138970"/>
+            <a:off x="2925817" y="3885199"/>
             <a:ext cx="0" cy="203311"/>
           </a:xfrm>
           <a:prstGeom prst="straightConnector1">
@@ -4366,7 +4366,7 @@
         </p:nvCxnSpPr>
         <p:spPr>
           <a:xfrm flipH="1">
-            <a:off x="2925813" y="3807364"/>
+            <a:off x="2925813" y="4553593"/>
             <a:ext cx="4" cy="177998"/>
           </a:xfrm>
           <a:prstGeom prst="straightConnector1">
@@ -4412,7 +4412,7 @@
         </p:nvCxnSpPr>
         <p:spPr>
           <a:xfrm>
-            <a:off x="2925813" y="4308556"/>
+            <a:off x="2925813" y="5054785"/>
             <a:ext cx="1" cy="263747"/>
           </a:xfrm>
           <a:prstGeom prst="straightConnector1">
@@ -4458,7 +4458,7 @@
         </p:nvCxnSpPr>
         <p:spPr>
           <a:xfrm>
-            <a:off x="2925814" y="4895497"/>
+            <a:off x="2925814" y="5641726"/>
             <a:ext cx="0" cy="234964"/>
           </a:xfrm>
           <a:prstGeom prst="straightConnector1">
@@ -4504,7 +4504,7 @@
         </p:nvCxnSpPr>
         <p:spPr>
           <a:xfrm flipH="1">
-            <a:off x="2915793" y="3574823"/>
+            <a:off x="2915793" y="4321052"/>
             <a:ext cx="1070256" cy="2228861"/>
           </a:xfrm>
           <a:prstGeom prst="bentConnector4">
@@ -4553,7 +4553,7 @@
         </p:nvCxnSpPr>
         <p:spPr>
           <a:xfrm rot="10800000" flipH="1">
-            <a:off x="1865582" y="3574824"/>
+            <a:off x="1865582" y="4321053"/>
             <a:ext cx="2" cy="1717235"/>
           </a:xfrm>
           <a:prstGeom prst="bentConnector3">
@@ -4597,7 +4597,7 @@
         </p:nvSpPr>
         <p:spPr>
           <a:xfrm>
-            <a:off x="1856043" y="5803684"/>
+            <a:off x="1856043" y="6549913"/>
             <a:ext cx="2119500" cy="323194"/>
           </a:xfrm>
           <a:prstGeom prst="flowChartProcess">
@@ -4676,7 +4676,7 @@
         </p:nvCxnSpPr>
         <p:spPr>
           <a:xfrm>
-            <a:off x="2915793" y="6126878"/>
+            <a:off x="2915793" y="6873107"/>
             <a:ext cx="0" cy="218073"/>
           </a:xfrm>
           <a:prstGeom prst="straightConnector1">
@@ -4718,7 +4718,7 @@
         </p:nvSpPr>
         <p:spPr>
           <a:xfrm>
-            <a:off x="1429406" y="3257489"/>
+            <a:off x="1429406" y="4003718"/>
             <a:ext cx="1019504" cy="230832"/>
           </a:xfrm>
           <a:prstGeom prst="rect">
@@ -4817,7 +4817,7 @@
         </p:nvSpPr>
         <p:spPr>
           <a:xfrm>
-            <a:off x="4572000" y="156251"/>
+            <a:off x="4572000" y="912995"/>
             <a:ext cx="3363301" cy="6435145"/>
           </a:xfrm>
           <a:prstGeom prst="wedgeRoundRectCallout">
@@ -4876,7 +4876,7 @@
         </p:nvSpPr>
         <p:spPr>
           <a:xfrm>
-            <a:off x="4761772" y="2046523"/>
+            <a:off x="4761772" y="2803267"/>
             <a:ext cx="2932386" cy="3349901"/>
           </a:xfrm>
           <a:prstGeom prst="roundRect">
@@ -4933,7 +4933,7 @@
         </p:nvSpPr>
         <p:spPr>
           <a:xfrm>
-            <a:off x="5168458" y="2149194"/>
+            <a:off x="5168458" y="2905938"/>
             <a:ext cx="2119500" cy="465083"/>
           </a:xfrm>
           <a:prstGeom prst="flowChartDecision">
@@ -5008,7 +5008,7 @@
         </p:nvSpPr>
         <p:spPr>
           <a:xfrm>
-            <a:off x="5168458" y="1078497"/>
+            <a:off x="5168458" y="1835241"/>
             <a:ext cx="2119500" cy="323194"/>
           </a:xfrm>
           <a:prstGeom prst="flowChartProcess">
@@ -5103,7 +5103,7 @@
         </p:nvSpPr>
         <p:spPr>
           <a:xfrm>
-            <a:off x="5168458" y="1597523"/>
+            <a:off x="5168458" y="2354267"/>
             <a:ext cx="2119500" cy="323194"/>
           </a:xfrm>
           <a:prstGeom prst="flowChartProcess">
@@ -5191,7 +5191,7 @@
         </p:nvSpPr>
         <p:spPr>
           <a:xfrm>
-            <a:off x="5168459" y="2810193"/>
+            <a:off x="5168459" y="3566937"/>
             <a:ext cx="2119500" cy="323194"/>
           </a:xfrm>
           <a:prstGeom prst="flowChartProcess">
@@ -5266,7 +5266,7 @@
         </p:nvSpPr>
         <p:spPr>
           <a:xfrm>
-            <a:off x="5168458" y="3330054"/>
+            <a:off x="5168458" y="4086798"/>
             <a:ext cx="2119500" cy="323194"/>
           </a:xfrm>
           <a:prstGeom prst="flowChartProcess">
@@ -5354,7 +5354,7 @@
         </p:nvSpPr>
         <p:spPr>
           <a:xfrm>
-            <a:off x="5168458" y="3835519"/>
+            <a:off x="5168458" y="4592263"/>
             <a:ext cx="2119500" cy="323194"/>
           </a:xfrm>
           <a:prstGeom prst="flowChartProcess">
@@ -5429,7 +5429,7 @@
         </p:nvSpPr>
         <p:spPr>
           <a:xfrm>
-            <a:off x="5168458" y="4407085"/>
+            <a:off x="5168458" y="5163829"/>
             <a:ext cx="2119500" cy="323194"/>
           </a:xfrm>
           <a:prstGeom prst="flowChartProcess">
@@ -5504,7 +5504,7 @@
         </p:nvSpPr>
         <p:spPr>
           <a:xfrm>
-            <a:off x="5167974" y="4951785"/>
+            <a:off x="5167974" y="5708529"/>
             <a:ext cx="2119983" cy="323194"/>
           </a:xfrm>
           <a:prstGeom prst="flowChartProcess">
@@ -5599,7 +5599,7 @@
         </p:nvSpPr>
         <p:spPr>
           <a:xfrm>
-            <a:off x="5157953" y="5614498"/>
+            <a:off x="5157953" y="6371242"/>
             <a:ext cx="2119500" cy="323194"/>
           </a:xfrm>
           <a:prstGeom prst="flowChartProcess">
@@ -5678,7 +5678,7 @@
         </p:nvCxnSpPr>
         <p:spPr>
           <a:xfrm rot="10800000" flipH="1">
-            <a:off x="5167974" y="2381736"/>
+            <a:off x="5167974" y="3138480"/>
             <a:ext cx="484" cy="2731646"/>
           </a:xfrm>
           <a:prstGeom prst="bentConnector3">
@@ -5726,7 +5726,7 @@
         </p:nvCxnSpPr>
         <p:spPr>
           <a:xfrm>
-            <a:off x="6228208" y="1401691"/>
+            <a:off x="6228208" y="2158435"/>
             <a:ext cx="0" cy="195832"/>
           </a:xfrm>
           <a:prstGeom prst="straightConnector1">
@@ -5772,7 +5772,7 @@
         </p:nvCxnSpPr>
         <p:spPr>
           <a:xfrm>
-            <a:off x="6228208" y="1920717"/>
+            <a:off x="6228208" y="2677461"/>
             <a:ext cx="0" cy="228477"/>
           </a:xfrm>
           <a:prstGeom prst="straightConnector1">
@@ -5818,7 +5818,7 @@
         </p:nvCxnSpPr>
         <p:spPr>
           <a:xfrm>
-            <a:off x="6228208" y="2614277"/>
+            <a:off x="6228208" y="3371021"/>
             <a:ext cx="1" cy="195916"/>
           </a:xfrm>
           <a:prstGeom prst="straightConnector1">
@@ -5864,7 +5864,7 @@
         </p:nvCxnSpPr>
         <p:spPr>
           <a:xfrm flipH="1">
-            <a:off x="6228208" y="3133387"/>
+            <a:off x="6228208" y="3890131"/>
             <a:ext cx="1" cy="196667"/>
           </a:xfrm>
           <a:prstGeom prst="straightConnector1">
@@ -5910,7 +5910,7 @@
         </p:nvCxnSpPr>
         <p:spPr>
           <a:xfrm>
-            <a:off x="6228208" y="3653248"/>
+            <a:off x="6228208" y="4409992"/>
             <a:ext cx="0" cy="182271"/>
           </a:xfrm>
           <a:prstGeom prst="straightConnector1">
@@ -5956,7 +5956,7 @@
         </p:nvCxnSpPr>
         <p:spPr>
           <a:xfrm>
-            <a:off x="6228208" y="4158713"/>
+            <a:off x="6228208" y="4915457"/>
             <a:ext cx="0" cy="248372"/>
           </a:xfrm>
           <a:prstGeom prst="straightConnector1">
@@ -6002,7 +6002,7 @@
         </p:nvCxnSpPr>
         <p:spPr>
           <a:xfrm flipH="1">
-            <a:off x="6227966" y="4730279"/>
+            <a:off x="6227966" y="5487023"/>
             <a:ext cx="242" cy="221506"/>
           </a:xfrm>
           <a:prstGeom prst="straightConnector1">
@@ -6048,7 +6048,7 @@
         </p:nvCxnSpPr>
         <p:spPr>
           <a:xfrm flipH="1">
-            <a:off x="6217703" y="2381736"/>
+            <a:off x="6217703" y="3138480"/>
             <a:ext cx="1070255" cy="3232762"/>
           </a:xfrm>
           <a:prstGeom prst="bentConnector4">
@@ -6093,7 +6093,7 @@
         </p:nvSpPr>
         <p:spPr>
           <a:xfrm>
-            <a:off x="5916838" y="602924"/>
+            <a:off x="5916838" y="1359668"/>
             <a:ext cx="622739" cy="228600"/>
           </a:xfrm>
           <a:prstGeom prst="flowChartTerminator">
@@ -6170,7 +6170,7 @@
         </p:nvSpPr>
         <p:spPr>
           <a:xfrm>
-            <a:off x="5906333" y="6155765"/>
+            <a:off x="5906333" y="6912509"/>
             <a:ext cx="622739" cy="228600"/>
           </a:xfrm>
           <a:prstGeom prst="flowChartTerminator">
@@ -6251,7 +6251,7 @@
         </p:nvCxnSpPr>
         <p:spPr>
           <a:xfrm>
-            <a:off x="6217703" y="5937692"/>
+            <a:off x="6217703" y="6694436"/>
             <a:ext cx="0" cy="218073"/>
           </a:xfrm>
           <a:prstGeom prst="straightConnector1">
@@ -6297,7 +6297,7 @@
         </p:nvCxnSpPr>
         <p:spPr>
           <a:xfrm>
-            <a:off x="6228208" y="831524"/>
+            <a:off x="6228208" y="1588268"/>
             <a:ext cx="0" cy="246973"/>
           </a:xfrm>
           <a:prstGeom prst="straightConnector1">
@@ -6339,7 +6339,7 @@
         </p:nvSpPr>
         <p:spPr>
           <a:xfrm>
-            <a:off x="5156875" y="263712"/>
+            <a:off x="5156875" y="1020456"/>
             <a:ext cx="2119985" cy="276999"/>
           </a:xfrm>
           <a:prstGeom prst="rect">
@@ -6389,7 +6389,7 @@
         </p:nvSpPr>
         <p:spPr>
           <a:xfrm>
-            <a:off x="4832713" y="2082110"/>
+            <a:off x="4832713" y="2838854"/>
             <a:ext cx="1019504" cy="230832"/>
           </a:xfrm>
           <a:prstGeom prst="rect">
@@ -6417,6 +6417,153 @@
           </a:p>
         </p:txBody>
       </p:sp>
+      <p:sp>
+        <p:nvSpPr>
+          <p:cNvPr id="53" name="フローチャート: 定義済み処理 52">
+            <a:extLst>
+              <a:ext uri="{FF2B5EF4-FFF2-40B4-BE49-F238E27FC236}">
+                <a16:creationId xmlns:a16="http://schemas.microsoft.com/office/drawing/2014/main" id="{E730D140-927E-064D-B648-FE1ED45C0EEC}"/>
+              </a:ext>
+            </a:extLst>
+          </p:cNvPr>
+          <p:cNvSpPr/>
+          <p:nvPr/>
+        </p:nvSpPr>
+        <p:spPr>
+          <a:xfrm>
+            <a:off x="1865579" y="2137226"/>
+            <a:ext cx="2120466" cy="510900"/>
+          </a:xfrm>
+          <a:prstGeom prst="flowChartPredefinedProcess">
+            <a:avLst/>
+          </a:prstGeom>
+          <a:solidFill>
+            <a:schemeClr val="bg1"/>
+          </a:solidFill>
+          <a:ln>
+            <a:solidFill>
+              <a:schemeClr val="tx1"/>
+            </a:solidFill>
+          </a:ln>
+        </p:spPr>
+        <p:style>
+          <a:lnRef idx="2">
+            <a:schemeClr val="accent1">
+              <a:shade val="50000"/>
+            </a:schemeClr>
+          </a:lnRef>
+          <a:fillRef idx="1">
+            <a:schemeClr val="accent1"/>
+          </a:fillRef>
+          <a:effectRef idx="0">
+            <a:schemeClr val="accent1"/>
+          </a:effectRef>
+          <a:fontRef idx="minor">
+            <a:schemeClr val="lt1"/>
+          </a:fontRef>
+        </p:style>
+        <p:txBody>
+          <a:bodyPr rot="0" spcFirstLastPara="0" vertOverflow="overflow" horzOverflow="overflow" vert="horz" wrap="square" lIns="68580" tIns="34290" rIns="68580" bIns="34290" numCol="1" spcCol="0" rtlCol="0" fromWordArt="0" anchor="ctr" anchorCtr="0" forceAA="0" compatLnSpc="1">
+            <a:prstTxWarp prst="textNoShape">
+              <a:avLst/>
+            </a:prstTxWarp>
+            <a:noAutofit/>
+          </a:bodyPr>
+          <a:lstStyle/>
+          <a:p>
+            <a:pPr algn="ctr"/>
+            <a:r>
+              <a:rPr lang="en-US" altLang="ja-JP" sz="900" dirty="0">
+                <a:solidFill>
+                  <a:schemeClr val="tx1"/>
+                </a:solidFill>
+                <a:latin typeface="Times New Roman" panose="02020603050405020304" pitchFamily="18" charset="0"/>
+                <a:cs typeface="Times New Roman" panose="02020603050405020304" pitchFamily="18" charset="0"/>
+              </a:rPr>
+              <a:t>Solve a Lagrange dual problem</a:t>
+            </a:r>
+          </a:p>
+          <a:p>
+            <a:pPr algn="ctr"/>
+            <a:r>
+              <a:rPr lang="en-US" altLang="ja-JP" sz="900" dirty="0">
+                <a:solidFill>
+                  <a:schemeClr val="tx1"/>
+                </a:solidFill>
+                <a:latin typeface="Times New Roman" panose="02020603050405020304" pitchFamily="18" charset="0"/>
+                <a:cs typeface="Times New Roman" panose="02020603050405020304" pitchFamily="18" charset="0"/>
+              </a:rPr>
+              <a:t>to obtain a good initial solution.</a:t>
+            </a:r>
+          </a:p>
+          <a:p>
+            <a:pPr algn="ctr"/>
+            <a:r>
+              <a:rPr lang="en-US" altLang="ja-JP" sz="900" dirty="0">
+                <a:solidFill>
+                  <a:schemeClr val="tx1"/>
+                </a:solidFill>
+                <a:latin typeface="Times New Roman" panose="02020603050405020304" pitchFamily="18" charset="0"/>
+                <a:cs typeface="Times New Roman" panose="02020603050405020304" pitchFamily="18" charset="0"/>
+              </a:rPr>
+              <a:t>(Optional)</a:t>
+            </a:r>
+            <a:endParaRPr lang="ja-JP" altLang="en-US" sz="900">
+              <a:solidFill>
+                <a:schemeClr val="tx1"/>
+              </a:solidFill>
+              <a:latin typeface="Times New Roman" panose="02020603050405020304" pitchFamily="18" charset="0"/>
+              <a:cs typeface="Times New Roman" panose="02020603050405020304" pitchFamily="18" charset="0"/>
+            </a:endParaRPr>
+          </a:p>
+        </p:txBody>
+      </p:sp>
+      <p:cxnSp>
+        <p:nvCxnSpPr>
+          <p:cNvPr id="57" name="直線矢印コネクタ 56">
+            <a:extLst>
+              <a:ext uri="{FF2B5EF4-FFF2-40B4-BE49-F238E27FC236}">
+                <a16:creationId xmlns:a16="http://schemas.microsoft.com/office/drawing/2014/main" id="{B7E3A3EC-BF10-C445-8C7F-9304296632E6}"/>
+              </a:ext>
+            </a:extLst>
+          </p:cNvPr>
+          <p:cNvCxnSpPr>
+            <a:cxnSpLocks/>
+            <a:stCxn id="9" idx="2"/>
+            <a:endCxn id="53" idx="0"/>
+          </p:cNvCxnSpPr>
+          <p:nvPr/>
+        </p:nvCxnSpPr>
+        <p:spPr>
+          <a:xfrm flipH="1">
+            <a:off x="2925812" y="1920717"/>
+            <a:ext cx="5" cy="216509"/>
+          </a:xfrm>
+          <a:prstGeom prst="straightConnector1">
+            <a:avLst/>
+          </a:prstGeom>
+          <a:ln>
+            <a:solidFill>
+              <a:schemeClr val="tx1"/>
+            </a:solidFill>
+            <a:tailEnd type="triangle"/>
+          </a:ln>
+        </p:spPr>
+        <p:style>
+          <a:lnRef idx="1">
+            <a:schemeClr val="accent1"/>
+          </a:lnRef>
+          <a:fillRef idx="0">
+            <a:schemeClr val="accent1"/>
+          </a:fillRef>
+          <a:effectRef idx="0">
+            <a:schemeClr val="accent1"/>
+          </a:effectRef>
+          <a:fontRef idx="minor">
+            <a:schemeClr val="tx1"/>
+          </a:fontRef>
+        </p:style>
+      </p:cxnSp>
     </p:spTree>
     <p:extLst>
       <p:ext uri="{BB962C8B-B14F-4D97-AF65-F5344CB8AC3E}">

</xml_diff>